<commit_message>
Updated slides to version 28.09.2018.
</commit_message>
<xml_diff>
--- a/slides/Introduction to Kotlin.pptx
+++ b/slides/Introduction to Kotlin.pptx
@@ -13,7 +13,7 @@
   <p:sldIdLst>
     <p:sldId id="259" r:id="rId2"/>
     <p:sldId id="265" r:id="rId3"/>
-    <p:sldId id="266" r:id="rId4"/>
+    <p:sldId id="273" r:id="rId4"/>
     <p:sldId id="262" r:id="rId5"/>
     <p:sldId id="267" r:id="rId6"/>
     <p:sldId id="269" r:id="rId7"/>
@@ -160,7 +160,7 @@
           <p14:sldIdLst>
             <p14:sldId id="259"/>
             <p14:sldId id="265"/>
-            <p14:sldId id="266"/>
+            <p14:sldId id="273"/>
           </p14:sldIdLst>
         </p14:section>
         <p14:section name="Basics" id="{A0DC9DE5-8089-4522-9864-D6267B45689E}">
@@ -201,10 +201,6 @@
 </p:presentation>
 </file>
 
-<file path=ppt/revisionInfo.xml><?xml version="1.0" encoding="utf-8"?>
-<p1510:revInfo xmlns:a="http://schemas.openxmlformats.org/drawingml/2006/main" xmlns:r="http://schemas.openxmlformats.org/officeDocument/2006/relationships" xmlns:p1510="http://schemas.microsoft.com/office/powerpoint/2015/10/main"/>
-</file>
-
 <file path=ppt/handoutMasters/handoutMaster1.xml><?xml version="1.0" encoding="utf-8"?>
 <p:handoutMaster xmlns:a="http://schemas.openxmlformats.org/drawingml/2006/main" xmlns:r="http://schemas.openxmlformats.org/officeDocument/2006/relationships" xmlns:p="http://schemas.openxmlformats.org/presentationml/2006/main">
   <p:cSld>
@@ -484,7 +480,7 @@
               <a:pPr>
                 <a:defRPr/>
               </a:pPr>
-              <a:t>06.12.2017</a:t>
+              <a:t>25.09.2018</a:t>
             </a:fld>
             <a:endParaRPr lang="de-DE" dirty="0"/>
           </a:p>
@@ -20715,26 +20711,9 @@
           <a:lstStyle/>
           <a:p>
             <a:r>
-              <a:rPr lang="de-DE" sz="2800" dirty="0" err="1"/>
-              <a:t>Introduction</a:t>
-            </a:r>
-            <a:r>
-              <a:rPr lang="de-DE" sz="2800" dirty="0"/>
-              <a:t> </a:t>
-            </a:r>
-            <a:r>
-              <a:rPr lang="de-DE" sz="2800" dirty="0" err="1"/>
-              <a:t>to</a:t>
-            </a:r>
-            <a:r>
-              <a:rPr lang="de-DE" sz="2800" dirty="0"/>
-              <a:t> </a:t>
-            </a:r>
-            <a:r>
-              <a:rPr lang="de-DE" sz="2800" dirty="0" err="1"/>
-              <a:t>Kotlin</a:t>
-            </a:r>
-            <a:endParaRPr lang="de-DE" sz="2800" dirty="0"/>
+              <a:rPr lang="en-US" sz="2800"/>
+              <a:t>Introduction to Kotlin</a:t>
+            </a:r>
           </a:p>
         </p:txBody>
       </p:sp>
@@ -20765,8 +20744,8 @@
           <a:lstStyle/>
           <a:p>
             <a:r>
-              <a:rPr lang="de-DE" dirty="0"/>
-              <a:t>Tobias Schürg - 6.12.2017</a:t>
+              <a:rPr lang="en-US"/>
+              <a:t>Tobias Schürg - 25.09.2018</a:t>
             </a:r>
           </a:p>
         </p:txBody>
@@ -20800,8 +20779,8 @@
         </p:blipFill>
         <p:spPr bwMode="auto">
           <a:xfrm>
-            <a:off x="5807968" y="3068960"/>
-            <a:ext cx="864096" cy="858412"/>
+            <a:off x="5797478" y="3140968"/>
+            <a:ext cx="730570" cy="725764"/>
           </a:xfrm>
           <a:prstGeom prst="rect">
             <a:avLst/>
@@ -20973,7 +20952,7 @@
 </file>
 
 <file path=ppt/slides/slide10.xml><?xml version="1.0" encoding="utf-8"?>
-<p:sld xmlns:a="http://schemas.openxmlformats.org/drawingml/2006/main" xmlns:r="http://schemas.openxmlformats.org/officeDocument/2006/relationships" xmlns:p="http://schemas.openxmlformats.org/presentationml/2006/main">
+<p:sld xmlns:a="http://schemas.openxmlformats.org/drawingml/2006/main" xmlns:r="http://schemas.openxmlformats.org/officeDocument/2006/relationships" xmlns:p="http://schemas.openxmlformats.org/presentationml/2006/main" show="0">
   <p:cSld>
     <p:spTree>
       <p:nvGrpSpPr>
@@ -21034,7 +21013,7 @@
 </file>
 
 <file path=ppt/slides/slide11.xml><?xml version="1.0" encoding="utf-8"?>
-<p:sld xmlns:a="http://schemas.openxmlformats.org/drawingml/2006/main" xmlns:r="http://schemas.openxmlformats.org/officeDocument/2006/relationships" xmlns:p="http://schemas.openxmlformats.org/presentationml/2006/main">
+<p:sld xmlns:a="http://schemas.openxmlformats.org/drawingml/2006/main" xmlns:r="http://schemas.openxmlformats.org/officeDocument/2006/relationships" xmlns:p="http://schemas.openxmlformats.org/presentationml/2006/main" show="0">
   <p:cSld>
     <p:spTree>
       <p:nvGrpSpPr>
@@ -21736,7 +21715,15 @@
           <a:p>
             <a:r>
               <a:rPr lang="en-US" dirty="0"/>
-              <a:t>The new fancy, opensource programming language</a:t>
+              <a:t>The </a:t>
+            </a:r>
+            <a:r>
+              <a:rPr lang="en-US" strike="sngStrike" dirty="0"/>
+              <a:t>new</a:t>
+            </a:r>
+            <a:r>
+              <a:rPr lang="en-US" dirty="0"/>
+              <a:t> fancy, opensource programming language</a:t>
             </a:r>
           </a:p>
         </p:txBody>
@@ -21790,7 +21777,12 @@
             <p:ph idx="1"/>
           </p:nvPr>
         </p:nvSpPr>
-        <p:spPr/>
+        <p:spPr>
+          <a:xfrm>
+            <a:off x="911424" y="1639138"/>
+            <a:ext cx="6192688" cy="4531483"/>
+          </a:xfrm>
+        </p:spPr>
         <p:txBody>
           <a:bodyPr/>
           <a:lstStyle/>
@@ -21808,7 +21800,7 @@
             <a:pPr marL="971550" lvl="1" indent="-285750"/>
             <a:r>
               <a:rPr lang="en-US" dirty="0"/>
-              <a:t>Can be compiled to JavaScript</a:t>
+              <a:t>Can be compiled to JavaScript as well</a:t>
             </a:r>
           </a:p>
           <a:p>
@@ -21838,15 +21830,7 @@
             </a:pPr>
             <a:r>
               <a:rPr lang="en-US" dirty="0"/>
-              <a:t>Developed by </a:t>
-            </a:r>
-            <a:r>
-              <a:rPr lang="en-US" dirty="0" err="1"/>
-              <a:t>JetBrains</a:t>
-            </a:r>
-            <a:r>
-              <a:rPr lang="en-US" dirty="0"/>
-              <a:t> (IntelliJ)</a:t>
+              <a:t>Developed by JetBrains (IntelliJ)</a:t>
             </a:r>
           </a:p>
           <a:p>
@@ -21861,21 +21845,6 @@
             <a:r>
               <a:rPr lang="en-US" dirty="0"/>
               <a:t>Kotlin v1.0 was released on February 15, 2016</a:t>
-            </a:r>
-          </a:p>
-          <a:p>
-            <a:pPr marL="971550" lvl="1" indent="-285750"/>
-            <a:r>
-              <a:rPr lang="en-US" dirty="0"/>
-              <a:t>Goals: compile as quickly as Java, more compact, more </a:t>
-            </a:r>
-            <a:r>
-              <a:rPr lang="en-US" dirty="0" err="1"/>
-              <a:t>cocise</a:t>
-            </a:r>
-            <a:r>
-              <a:rPr lang="en-US" dirty="0"/>
-              <a:t>, easier to read</a:t>
             </a:r>
           </a:p>
           <a:p>
@@ -21885,29 +21854,36 @@
             </a:pPr>
             <a:r>
               <a:rPr lang="en-US" dirty="0"/>
-              <a:t>Kotlin Native</a:t>
+              <a:t>Goals: </a:t>
             </a:r>
           </a:p>
           <a:p>
             <a:pPr marL="971550" lvl="1" indent="-285750"/>
             <a:r>
               <a:rPr lang="en-US" dirty="0"/>
-              <a:t>Windows (x86_64 only at the moment), Linux (x86_64, arm32, MIPS, MIPS little endian),</a:t>
-            </a:r>
-            <a:br>
+              <a:t>compile as quickly as Java</a:t>
+            </a:r>
+          </a:p>
+          <a:p>
+            <a:pPr marL="971550" lvl="1" indent="-285750"/>
+            <a:r>
               <a:rPr lang="en-US" dirty="0"/>
-            </a:br>
+              <a:t>more compact</a:t>
+            </a:r>
+          </a:p>
+          <a:p>
+            <a:pPr marL="971550" lvl="1" indent="-285750"/>
             <a:r>
               <a:rPr lang="en-US" dirty="0"/>
-              <a:t>MacOS (x86_64), iOS (arm64 only), Android (arm32 and arm64)</a:t>
-            </a:r>
-          </a:p>
-          <a:p>
-            <a:pPr marL="285750" indent="-285750">
-              <a:buFont typeface="Arial" panose="020B0604020202020204" pitchFamily="34" charset="0"/>
-              <a:buChar char="•"/>
-            </a:pPr>
-            <a:endParaRPr lang="en-US" dirty="0"/>
+              <a:t>more concise</a:t>
+            </a:r>
+          </a:p>
+          <a:p>
+            <a:pPr marL="971550" lvl="1" indent="-285750"/>
+            <a:r>
+              <a:rPr lang="en-US" dirty="0"/>
+              <a:t> easier to read</a:t>
+            </a:r>
           </a:p>
         </p:txBody>
       </p:sp>
@@ -21940,13 +21916,18 @@
         </p:blipFill>
         <p:spPr bwMode="auto">
           <a:xfrm>
-            <a:off x="7464152" y="481786"/>
+            <a:off x="7519688" y="332656"/>
             <a:ext cx="4408960" cy="2314704"/>
           </a:xfrm>
           <a:prstGeom prst="rect">
             <a:avLst/>
           </a:prstGeom>
-          <a:noFill/>
+          <a:ln>
+            <a:noFill/>
+          </a:ln>
+          <a:effectLst>
+            <a:softEdge rad="112500"/>
+          </a:effectLst>
           <a:extLst>
             <a:ext uri="{909E8E84-426E-40DD-AFC4-6F175D3DCCD1}">
               <a14:hiddenFill xmlns:a14="http://schemas.microsoft.com/office/drawing/2010/main">
@@ -21987,13 +21968,117 @@
         </p:blipFill>
         <p:spPr bwMode="auto">
           <a:xfrm>
-            <a:off x="9668632" y="3953842"/>
-            <a:ext cx="2021541" cy="2021541"/>
+            <a:off x="5890312" y="1999176"/>
+            <a:ext cx="1213800" cy="1213800"/>
           </a:xfrm>
           <a:prstGeom prst="rect">
             <a:avLst/>
           </a:prstGeom>
           <a:noFill/>
+          <a:extLst>
+            <a:ext uri="{909E8E84-426E-40DD-AFC4-6F175D3DCCD1}">
+              <a14:hiddenFill xmlns:a14="http://schemas.microsoft.com/office/drawing/2010/main">
+                <a:solidFill>
+                  <a:srgbClr val="FFFFFF"/>
+                </a:solidFill>
+              </a14:hiddenFill>
+            </a:ext>
+          </a:extLst>
+        </p:spPr>
+      </p:pic>
+      <p:pic>
+        <p:nvPicPr>
+          <p:cNvPr id="2050" name="Picture 2" descr="Image result for kotlin android">
+            <a:extLst>
+              <a:ext uri="{FF2B5EF4-FFF2-40B4-BE49-F238E27FC236}">
+                <a16:creationId xmlns:a16="http://schemas.microsoft.com/office/drawing/2014/main" id="{DC11EF4B-1F15-4E0A-8CE8-0F1617EEC0A2}"/>
+              </a:ext>
+            </a:extLst>
+          </p:cNvPr>
+          <p:cNvPicPr>
+            <a:picLocks noChangeAspect="1" noChangeArrowheads="1"/>
+          </p:cNvPicPr>
+          <p:nvPr/>
+        </p:nvPicPr>
+        <p:blipFill>
+          <a:blip r:embed="rId4">
+            <a:extLst>
+              <a:ext uri="{28A0092B-C50C-407E-A947-70E740481C1C}">
+                <a14:useLocalDpi xmlns:a14="http://schemas.microsoft.com/office/drawing/2010/main" val="0"/>
+              </a:ext>
+            </a:extLst>
+          </a:blip>
+          <a:srcRect/>
+          <a:stretch>
+            <a:fillRect/>
+          </a:stretch>
+        </p:blipFill>
+        <p:spPr bwMode="auto">
+          <a:xfrm>
+            <a:off x="5375920" y="4693206"/>
+            <a:ext cx="2160240" cy="2160240"/>
+          </a:xfrm>
+          <a:prstGeom prst="rect">
+            <a:avLst/>
+          </a:prstGeom>
+          <a:ln>
+            <a:noFill/>
+          </a:ln>
+          <a:effectLst>
+            <a:softEdge rad="112500"/>
+          </a:effectLst>
+          <a:extLst>
+            <a:ext uri="{909E8E84-426E-40DD-AFC4-6F175D3DCCD1}">
+              <a14:hiddenFill xmlns:a14="http://schemas.microsoft.com/office/drawing/2010/main">
+                <a:solidFill>
+                  <a:srgbClr val="FFFFFF"/>
+                </a:solidFill>
+              </a14:hiddenFill>
+            </a:ext>
+          </a:extLst>
+        </p:spPr>
+      </p:pic>
+      <p:pic>
+        <p:nvPicPr>
+          <p:cNvPr id="2" name="Picture 4" descr="Image result for kotlin android">
+            <a:extLst>
+              <a:ext uri="{FF2B5EF4-FFF2-40B4-BE49-F238E27FC236}">
+                <a16:creationId xmlns:a16="http://schemas.microsoft.com/office/drawing/2014/main" id="{4A13AB33-B031-4D4D-8DF0-2043A9D380E9}"/>
+              </a:ext>
+            </a:extLst>
+          </p:cNvPr>
+          <p:cNvPicPr>
+            <a:picLocks noChangeAspect="1" noChangeArrowheads="1"/>
+          </p:cNvPicPr>
+          <p:nvPr/>
+        </p:nvPicPr>
+        <p:blipFill>
+          <a:blip r:embed="rId5">
+            <a:extLst>
+              <a:ext uri="{28A0092B-C50C-407E-A947-70E740481C1C}">
+                <a14:useLocalDpi xmlns:a14="http://schemas.microsoft.com/office/drawing/2010/main" val="0"/>
+              </a:ext>
+            </a:extLst>
+          </a:blip>
+          <a:srcRect/>
+          <a:stretch>
+            <a:fillRect/>
+          </a:stretch>
+        </p:blipFill>
+        <p:spPr bwMode="auto">
+          <a:xfrm>
+            <a:off x="8493160" y="3140968"/>
+            <a:ext cx="3723520" cy="3723520"/>
+          </a:xfrm>
+          <a:prstGeom prst="rect">
+            <a:avLst/>
+          </a:prstGeom>
+          <a:ln>
+            <a:noFill/>
+          </a:ln>
+          <a:effectLst>
+            <a:softEdge rad="112500"/>
+          </a:effectLst>
           <a:extLst>
             <a:ext uri="{909E8E84-426E-40DD-AFC4-6F175D3DCCD1}">
               <a14:hiddenFill xmlns:a14="http://schemas.microsoft.com/office/drawing/2010/main">
@@ -22040,7 +22125,7 @@
           <p:cNvPr id="2" name="Textplatzhalter 1">
             <a:extLst>
               <a:ext uri="{FF2B5EF4-FFF2-40B4-BE49-F238E27FC236}">
-                <a16:creationId xmlns:a16="http://schemas.microsoft.com/office/drawing/2014/main" id="{9534CAA3-9567-4017-9D0F-FDFB7F9908E6}"/>
+                <a16:creationId xmlns:a16="http://schemas.microsoft.com/office/drawing/2014/main" id="{8FB92702-B37E-4CC6-89C2-39E12F5BCE78}"/>
               </a:ext>
             </a:extLst>
           </p:cNvPr>
@@ -22053,8 +22138,8 @@
         </p:nvSpPr>
         <p:spPr>
           <a:xfrm>
-            <a:off x="2471550" y="332656"/>
-            <a:ext cx="7055632" cy="400110"/>
+            <a:off x="912084" y="1084674"/>
+            <a:ext cx="4895884" cy="400110"/>
           </a:xfrm>
         </p:spPr>
         <p:txBody>
@@ -22062,8 +22147,8 @@
           <a:lstStyle/>
           <a:p>
             <a:r>
-              <a:rPr lang="en-US" sz="1400" dirty="0"/>
-              <a:t>(source https://en.wikipedia.org/wiki/Kotlin_(programming_language)#Adoption)</a:t>
+              <a:rPr lang="en-US" dirty="0"/>
+              <a:t>Compile Kotlin to native binaries</a:t>
             </a:r>
           </a:p>
         </p:txBody>
@@ -22073,7 +22158,7 @@
           <p:cNvPr id="3" name="Textplatzhalter 2">
             <a:extLst>
               <a:ext uri="{FF2B5EF4-FFF2-40B4-BE49-F238E27FC236}">
-                <a16:creationId xmlns:a16="http://schemas.microsoft.com/office/drawing/2014/main" id="{21825850-928C-471B-BED7-673CF51AD910}"/>
+                <a16:creationId xmlns:a16="http://schemas.microsoft.com/office/drawing/2014/main" id="{95A8921B-52C8-4366-9828-12D891995649}"/>
               </a:ext>
             </a:extLst>
           </p:cNvPr>
@@ -22084,19 +22169,14 @@
             <p:ph type="body" sz="quarter" idx="19"/>
           </p:nvPr>
         </p:nvSpPr>
-        <p:spPr>
-          <a:xfrm>
-            <a:off x="912084" y="188640"/>
-            <a:ext cx="2087572" cy="480131"/>
-          </a:xfrm>
-        </p:spPr>
+        <p:spPr/>
         <p:txBody>
           <a:bodyPr/>
           <a:lstStyle/>
           <a:p>
             <a:r>
               <a:rPr lang="en-US" dirty="0"/>
-              <a:t>Adoption</a:t>
+              <a:t>Kotlin Native</a:t>
             </a:r>
           </a:p>
         </p:txBody>
@@ -22106,7 +22186,7 @@
           <p:cNvPr id="4" name="Inhaltsplatzhalter 3">
             <a:extLst>
               <a:ext uri="{FF2B5EF4-FFF2-40B4-BE49-F238E27FC236}">
-                <a16:creationId xmlns:a16="http://schemas.microsoft.com/office/drawing/2014/main" id="{3B0DA933-0825-4A45-8DDD-FBD4D21425C6}"/>
+                <a16:creationId xmlns:a16="http://schemas.microsoft.com/office/drawing/2014/main" id="{1E64D65E-F4BC-48A8-BE92-110AFF51B9F2}"/>
               </a:ext>
             </a:extLst>
           </p:cNvPr>
@@ -22119,12 +22199,12 @@
         </p:nvSpPr>
         <p:spPr>
           <a:xfrm>
-            <a:off x="911424" y="1124744"/>
-            <a:ext cx="10371856" cy="4886206"/>
-          </a:xfrm>
-        </p:spPr>
-        <p:txBody>
-          <a:bodyPr/>
+            <a:off x="911424" y="1639138"/>
+            <a:ext cx="4896544" cy="4531483"/>
+          </a:xfrm>
+        </p:spPr>
+        <p:txBody>
+          <a:bodyPr anchor="ctr"/>
           <a:lstStyle/>
           <a:p>
             <a:pPr marL="285750" indent="-285750">
@@ -22133,25 +22213,7 @@
             </a:pPr>
             <a:r>
               <a:rPr lang="en-US" dirty="0"/>
-              <a:t>According to the Kotlin website</a:t>
-            </a:r>
-          </a:p>
-          <a:p>
-            <a:pPr marL="971550" lvl="1" indent="-285750"/>
-            <a:r>
-              <a:rPr lang="en-US" dirty="0"/>
-              <a:t>Prezi is using Kotlin in the backend.</a:t>
-            </a:r>
-          </a:p>
-          <a:p>
-            <a:pPr marL="971550" lvl="1" indent="-285750"/>
-            <a:r>
-              <a:rPr lang="en-US" dirty="0" err="1"/>
-              <a:t>DripStat</a:t>
-            </a:r>
-            <a:r>
-              <a:rPr lang="en-US" dirty="0"/>
-              <a:t> has done a writeup of their experience with Kotlin.[28]</a:t>
+              <a:t>Windows (x86_64 only at the moment)</a:t>
             </a:r>
           </a:p>
           <a:p>
@@ -22161,73 +22223,8 @@
             </a:pPr>
             <a:r>
               <a:rPr lang="en-US" dirty="0"/>
-              <a:t>According to </a:t>
-            </a:r>
-            <a:r>
-              <a:rPr lang="en-US" dirty="0" err="1"/>
-              <a:t>Jetbrains</a:t>
-            </a:r>
-            <a:r>
-              <a:rPr lang="en-US" dirty="0"/>
-              <a:t> blog Kotlin is used among others by </a:t>
-            </a:r>
-          </a:p>
-          <a:p>
-            <a:pPr marL="971550" lvl="1" indent="-285750"/>
-            <a:r>
-              <a:rPr lang="en-US" dirty="0"/>
-              <a:t>Amazon Web Services</a:t>
-            </a:r>
-          </a:p>
-          <a:p>
-            <a:pPr marL="971550" lvl="1" indent="-285750"/>
-            <a:r>
-              <a:rPr lang="en-US" dirty="0"/>
-              <a:t>Pinterest</a:t>
-            </a:r>
-          </a:p>
-          <a:p>
-            <a:pPr marL="971550" lvl="1" indent="-285750"/>
-            <a:r>
-              <a:rPr lang="en-US" dirty="0"/>
-              <a:t>Coursera</a:t>
-            </a:r>
-          </a:p>
-          <a:p>
-            <a:pPr marL="971550" lvl="1" indent="-285750"/>
-            <a:r>
-              <a:rPr lang="en-US" dirty="0"/>
-              <a:t>Netflix</a:t>
-            </a:r>
-          </a:p>
-          <a:p>
-            <a:pPr marL="971550" lvl="1" indent="-285750"/>
-            <a:r>
-              <a:rPr lang="en-US" dirty="0"/>
-              <a:t>Uber</a:t>
-            </a:r>
-          </a:p>
-          <a:p>
-            <a:pPr marL="971550" lvl="1" indent="-285750"/>
-            <a:r>
-              <a:rPr lang="en-US" dirty="0"/>
-              <a:t>Square</a:t>
-            </a:r>
-          </a:p>
-          <a:p>
-            <a:pPr marL="971550" lvl="1" indent="-285750"/>
-            <a:r>
-              <a:rPr lang="en-US" dirty="0"/>
-              <a:t>Trello</a:t>
-            </a:r>
-          </a:p>
-          <a:p>
-            <a:pPr marL="971550" lvl="1" indent="-285750"/>
-            <a:r>
-              <a:rPr lang="en-US" dirty="0" err="1"/>
-              <a:t>Basecampand</a:t>
-            </a:r>
-            <a:endParaRPr lang="en-US" dirty="0"/>
+              <a:t>Linux (x86_64, arm32, MIPS, MIPS little endian)</a:t>
+            </a:r>
           </a:p>
           <a:p>
             <a:pPr marL="285750" indent="-285750">
@@ -22236,68 +22233,143 @@
             </a:pPr>
             <a:r>
               <a:rPr lang="en-US" dirty="0"/>
-              <a:t>According to Google, Kotlin has already been adopted by several major developers</a:t>
-            </a:r>
-          </a:p>
-          <a:p>
-            <a:pPr marL="971550" lvl="1" indent="-285750"/>
+              <a:t>MacOS (x86_64)</a:t>
+            </a:r>
+          </a:p>
+          <a:p>
+            <a:pPr marL="285750" indent="-285750">
+              <a:buFont typeface="Arial" panose="020B0604020202020204" pitchFamily="34" charset="0"/>
+              <a:buChar char="•"/>
+            </a:pPr>
             <a:r>
               <a:rPr lang="en-US" dirty="0"/>
-              <a:t>Expedia, Flipboard, Pinterest, Square, and others—for their Android production apps</a:t>
-            </a:r>
-          </a:p>
-        </p:txBody>
-      </p:sp>
-      <p:sp>
-        <p:nvSpPr>
-          <p:cNvPr id="5" name="Textfeld 4">
+              <a:t>iOS (arm32 and arm64)</a:t>
+            </a:r>
+          </a:p>
+          <a:p>
+            <a:pPr marL="285750" indent="-285750">
+              <a:buFont typeface="Arial" panose="020B0604020202020204" pitchFamily="34" charset="0"/>
+              <a:buChar char="•"/>
+            </a:pPr>
+            <a:r>
+              <a:rPr lang="en-US" dirty="0"/>
+              <a:t>Android (arm32 and arm64)</a:t>
+            </a:r>
+          </a:p>
+          <a:p>
+            <a:pPr marL="285750" indent="-285750">
+              <a:buFont typeface="Arial" panose="020B0604020202020204" pitchFamily="34" charset="0"/>
+              <a:buChar char="•"/>
+            </a:pPr>
+            <a:r>
+              <a:rPr lang="en-US" dirty="0" err="1"/>
+              <a:t>WebAssembly</a:t>
+            </a:r>
+            <a:r>
+              <a:rPr lang="en-US" dirty="0"/>
+              <a:t> (wasm32 only)</a:t>
+            </a:r>
+          </a:p>
+          <a:p>
+            <a:pPr marL="285750" indent="-285750">
+              <a:buFont typeface="Arial" panose="020B0604020202020204" pitchFamily="34" charset="0"/>
+              <a:buChar char="•"/>
+            </a:pPr>
+            <a:endParaRPr lang="en-US" dirty="0"/>
+          </a:p>
+          <a:p>
+            <a:endParaRPr lang="en-US" dirty="0"/>
+          </a:p>
+        </p:txBody>
+      </p:sp>
+      <p:pic>
+        <p:nvPicPr>
+          <p:cNvPr id="1026" name="Picture 2" descr="https://juan-medina.com/assets/img/kotlin_native.png">
             <a:extLst>
               <a:ext uri="{FF2B5EF4-FFF2-40B4-BE49-F238E27FC236}">
-                <a16:creationId xmlns:a16="http://schemas.microsoft.com/office/drawing/2014/main" id="{795EED60-D1F6-4651-A188-F3D1D6E1C5C9}"/>
+                <a16:creationId xmlns:a16="http://schemas.microsoft.com/office/drawing/2014/main" id="{2B4F9A52-A8B7-41E6-A4AE-AB9C6843278A}"/>
               </a:ext>
             </a:extLst>
           </p:cNvPr>
-          <p:cNvSpPr txBox="1"/>
+          <p:cNvPicPr>
+            <a:picLocks noChangeAspect="1" noChangeArrowheads="1"/>
+          </p:cNvPicPr>
           <p:nvPr/>
+        </p:nvPicPr>
+        <p:blipFill>
+          <a:blip r:embed="rId2">
+            <a:extLst>
+              <a:ext uri="{28A0092B-C50C-407E-A947-70E740481C1C}">
+                <a14:useLocalDpi xmlns:a14="http://schemas.microsoft.com/office/drawing/2010/main" val="0"/>
+              </a:ext>
+            </a:extLst>
+          </a:blip>
+          <a:srcRect/>
+          <a:stretch>
+            <a:fillRect/>
+          </a:stretch>
+        </p:blipFill>
+        <p:spPr bwMode="auto">
+          <a:xfrm>
+            <a:off x="6001617" y="0"/>
+            <a:ext cx="6215063" cy="6858000"/>
+          </a:xfrm>
+          <a:prstGeom prst="rect">
+            <a:avLst/>
+          </a:prstGeom>
+          <a:noFill/>
+          <a:extLst>
+            <a:ext uri="{909E8E84-426E-40DD-AFC4-6F175D3DCCD1}">
+              <a14:hiddenFill xmlns:a14="http://schemas.microsoft.com/office/drawing/2010/main">
+                <a:solidFill>
+                  <a:srgbClr val="FFFFFF"/>
+                </a:solidFill>
+              </a14:hiddenFill>
+            </a:ext>
+          </a:extLst>
+        </p:spPr>
+      </p:pic>
+      <p:sp>
+        <p:nvSpPr>
+          <p:cNvPr id="5" name="Rechteck 4">
+            <a:extLst>
+              <a:ext uri="{FF2B5EF4-FFF2-40B4-BE49-F238E27FC236}">
+                <a16:creationId xmlns:a16="http://schemas.microsoft.com/office/drawing/2014/main" id="{835F85BF-A4C8-4805-B6AD-F5AABE3BB652}"/>
+              </a:ext>
+            </a:extLst>
+          </p:cNvPr>
+          <p:cNvSpPr/>
+          <p:nvPr/>
         </p:nvSpPr>
         <p:spPr>
           <a:xfrm>
-            <a:off x="7464152" y="3140968"/>
-            <a:ext cx="4104455" cy="1077218"/>
-          </a:xfrm>
-          <a:prstGeom prst="rect">
-            <a:avLst/>
-          </a:prstGeom>
-          <a:noFill/>
-        </p:spPr>
-        <p:txBody>
-          <a:bodyPr vert="horz" wrap="square" lIns="0" tIns="0" rIns="0" bIns="0" rtlCol="0" anchor="ctr" anchorCtr="0">
+            <a:off x="565242" y="5805264"/>
+            <a:ext cx="4666662" cy="307777"/>
+          </a:xfrm>
+          <a:prstGeom prst="rect">
+            <a:avLst/>
+          </a:prstGeom>
+        </p:spPr>
+        <p:txBody>
+          <a:bodyPr wrap="none">
             <a:spAutoFit/>
           </a:bodyPr>
           <a:lstStyle/>
           <a:p>
-            <a:pPr>
-              <a:buFontTx/>
-              <a:buNone/>
-            </a:pPr>
             <a:r>
               <a:rPr lang="en-US" sz="1400" dirty="0">
-                <a:latin typeface="+mn-lt"/>
+                <a:hlinkClick r:id="rId3"/>
               </a:rPr>
-              <a:t>Corda, a distributed ledger developed by a consortium of well-known banks (such as Goldman Sachs, Wells Fargo, J.P. Morgan, Deutsche Bank, UBS, HSBC, BNP Paribas, Société Générale), has over 90% Kotlin in its codebase.</a:t>
-            </a:r>
-            <a:endParaRPr lang="en-US" sz="1400" b="0" i="0" dirty="0">
-              <a:latin typeface="+mn-lt"/>
-              <a:ea typeface="Raleway" charset="0"/>
-              <a:cs typeface="Raleway" charset="0"/>
-            </a:endParaRPr>
+              <a:t>https://kotlinlang.org/docs/reference/native-overview.html</a:t>
+            </a:r>
+            <a:endParaRPr lang="en-US" sz="1400" dirty="0"/>
           </a:p>
         </p:txBody>
       </p:sp>
     </p:spTree>
     <p:extLst>
       <p:ext uri="{BB962C8B-B14F-4D97-AF65-F5344CB8AC3E}">
-        <p14:creationId xmlns:p14="http://schemas.microsoft.com/office/powerpoint/2010/main" val="3316702046"/>
+        <p14:creationId xmlns:p14="http://schemas.microsoft.com/office/powerpoint/2010/main" val="3928137138"/>
       </p:ext>
     </p:extLst>
   </p:cSld>
@@ -22536,7 +22608,7 @@
 </file>
 
 <file path=ppt/slides/slide6.xml><?xml version="1.0" encoding="utf-8"?>
-<p:sld xmlns:a="http://schemas.openxmlformats.org/drawingml/2006/main" xmlns:r="http://schemas.openxmlformats.org/officeDocument/2006/relationships" xmlns:p="http://schemas.openxmlformats.org/presentationml/2006/main">
+<p:sld xmlns:a="http://schemas.openxmlformats.org/drawingml/2006/main" xmlns:r="http://schemas.openxmlformats.org/officeDocument/2006/relationships" xmlns:p="http://schemas.openxmlformats.org/presentationml/2006/main" show="0">
   <p:cSld>
     <p:spTree>
       <p:nvGrpSpPr>

</xml_diff>